<commit_message>
Diarama de solução feito
</commit_message>
<xml_diff>
--- a/documentacao/Diagrama de Solução.pptx
+++ b/documentacao/Diagrama de Solução.pptx
@@ -3338,6 +3338,64 @@
           <a:chExt cx="0" cy="0"/>
         </a:xfrm>
       </p:grpSpPr>
+      <p:sp>
+        <p:nvSpPr>
+          <p:cNvPr id="64" name="Nuvem 63">
+            <a:extLst>
+              <a:ext uri="{FF2B5EF4-FFF2-40B4-BE49-F238E27FC236}">
+                <a16:creationId xmlns:a16="http://schemas.microsoft.com/office/drawing/2014/main" id="{4BD7CB84-9683-43AC-B680-65D81A616BA9}"/>
+              </a:ext>
+            </a:extLst>
+          </p:cNvPr>
+          <p:cNvSpPr/>
+          <p:nvPr/>
+        </p:nvSpPr>
+        <p:spPr>
+          <a:xfrm>
+            <a:off x="9220792" y="2552311"/>
+            <a:ext cx="2661219" cy="1666017"/>
+          </a:xfrm>
+          <a:prstGeom prst="cloud">
+            <a:avLst/>
+          </a:prstGeom>
+          <a:solidFill>
+            <a:schemeClr val="bg1"/>
+          </a:solidFill>
+          <a:ln>
+            <a:solidFill>
+              <a:schemeClr val="tx1"/>
+            </a:solidFill>
+          </a:ln>
+        </p:spPr>
+        <p:style>
+          <a:lnRef idx="2">
+            <a:schemeClr val="accent1">
+              <a:shade val="50000"/>
+            </a:schemeClr>
+          </a:lnRef>
+          <a:fillRef idx="1">
+            <a:schemeClr val="accent1"/>
+          </a:fillRef>
+          <a:effectRef idx="0">
+            <a:schemeClr val="accent1"/>
+          </a:effectRef>
+          <a:fontRef idx="minor">
+            <a:schemeClr val="lt1"/>
+          </a:fontRef>
+        </p:style>
+        <p:txBody>
+          <a:bodyPr rtlCol="0" anchor="ctr"/>
+          <a:lstStyle/>
+          <a:p>
+            <a:pPr algn="ctr"/>
+            <a:endParaRPr lang="pt-BR" b="1" dirty="0">
+              <a:solidFill>
+                <a:schemeClr val="tx1"/>
+              </a:solidFill>
+            </a:endParaRPr>
+          </a:p>
+        </p:txBody>
+      </p:sp>
       <p:sp>
         <p:nvSpPr>
           <p:cNvPr id="124" name="Nuvem 123">
@@ -4495,7 +4553,7 @@
         </p:nvSpPr>
         <p:spPr>
           <a:xfrm>
-            <a:off x="9426924" y="786853"/>
+            <a:off x="9440176" y="1085651"/>
             <a:ext cx="1934818" cy="460297"/>
           </a:xfrm>
           <a:prstGeom prst="rect">
@@ -6155,7 +6213,7 @@
         </p:nvSpPr>
         <p:spPr>
           <a:xfrm>
-            <a:off x="9440176" y="1441279"/>
+            <a:off x="9583992" y="3132154"/>
             <a:ext cx="1934818" cy="460297"/>
           </a:xfrm>
           <a:prstGeom prst="rect">
@@ -6198,6 +6256,51 @@
           </a:p>
         </p:txBody>
       </p:sp>
+      <p:cxnSp>
+        <p:nvCxnSpPr>
+          <p:cNvPr id="30" name="Conector de Seta Reta 29">
+            <a:extLst>
+              <a:ext uri="{FF2B5EF4-FFF2-40B4-BE49-F238E27FC236}">
+                <a16:creationId xmlns:a16="http://schemas.microsoft.com/office/drawing/2014/main" id="{9EB7C173-B256-4137-9BC0-6E4695E3EFEB}"/>
+              </a:ext>
+            </a:extLst>
+          </p:cNvPr>
+          <p:cNvCxnSpPr>
+            <a:cxnSpLocks/>
+            <a:stCxn id="63" idx="0"/>
+          </p:cNvCxnSpPr>
+          <p:nvPr/>
+        </p:nvCxnSpPr>
+        <p:spPr>
+          <a:xfrm flipH="1" flipV="1">
+            <a:off x="10535086" y="2184519"/>
+            <a:ext cx="16315" cy="947635"/>
+          </a:xfrm>
+          <a:prstGeom prst="straightConnector1">
+            <a:avLst/>
+          </a:prstGeom>
+          <a:ln w="38100">
+            <a:solidFill>
+              <a:schemeClr val="tx1"/>
+            </a:solidFill>
+            <a:tailEnd type="triangle"/>
+          </a:ln>
+        </p:spPr>
+        <p:style>
+          <a:lnRef idx="1">
+            <a:schemeClr val="accent1"/>
+          </a:lnRef>
+          <a:fillRef idx="0">
+            <a:schemeClr val="accent1"/>
+          </a:fillRef>
+          <a:effectRef idx="0">
+            <a:schemeClr val="accent1"/>
+          </a:effectRef>
+          <a:fontRef idx="minor">
+            <a:schemeClr val="tx1"/>
+          </a:fontRef>
+        </p:style>
+      </p:cxnSp>
     </p:spTree>
     <p:extLst>
       <p:ext uri="{BB962C8B-B14F-4D97-AF65-F5344CB8AC3E}">

</xml_diff>